<commit_message>
[CYS] update: 6주차 앱 기획
</commit_message>
<xml_diff>
--- a/예제.pptx
+++ b/예제.pptx
@@ -9,7 +9,7 @@
   </p:notesMasterIdLst>
   <p:sldIdLst>
     <p:sldId id="256" r:id="rId2"/>
-    <p:sldId id="257" r:id="rId3"/>
+    <p:sldId id="258" r:id="rId3"/>
   </p:sldIdLst>
   <p:sldSz cx="12192000" cy="6858000"/>
   <p:notesSz cx="6858000" cy="9144000"/>
@@ -108,6 +108,11 @@
       </a:defRPr>
     </a:lvl9pPr>
   </p:defaultTextStyle>
+  <p:extLst>
+    <p:ext uri="{EFAFB233-063F-42B5-8137-9DF3F51BA10A}">
+      <p15:sldGuideLst xmlns:p15="http://schemas.microsoft.com/office/powerpoint/2012/main"/>
+    </p:ext>
+  </p:extLst>
 </p:presentation>
 </file>
 
@@ -193,7 +198,7 @@
           <a:p>
             <a:fld id="{6336E10D-C9CD-4DE6-AA5C-F508AA91F13F}" type="datetimeFigureOut">
               <a:rPr lang="ko-KR" altLang="en-US" smtClean="0"/>
-              <a:t>2024-03-19</a:t>
+              <a:t>2024-04-09</a:t>
             </a:fld>
             <a:endParaRPr lang="ko-KR" altLang="en-US"/>
           </a:p>
@@ -592,7 +597,7 @@
           <a:p>
             <a:fld id="{7BEC85B7-4AE5-4F69-B591-0C52ECF45F30}" type="datetime1">
               <a:rPr lang="ko-KR" altLang="en-US" smtClean="0"/>
-              <a:t>2024-03-19</a:t>
+              <a:t>2024-04-09</a:t>
             </a:fld>
             <a:endParaRPr lang="ko-KR" altLang="en-US"/>
           </a:p>
@@ -776,7 +781,7 @@
           <a:p>
             <a:fld id="{9F071616-2469-4292-918B-92EE87C17A41}" type="datetime1">
               <a:rPr lang="ko-KR" altLang="en-US" smtClean="0"/>
-              <a:t>2024-03-19</a:t>
+              <a:t>2024-04-09</a:t>
             </a:fld>
             <a:endParaRPr lang="ko-KR" altLang="en-US"/>
           </a:p>
@@ -963,7 +968,7 @@
           <a:p>
             <a:fld id="{4F9EDEF5-39C0-44B7-ACB1-E4DA65D90603}" type="datetime1">
               <a:rPr lang="ko-KR" altLang="en-US" smtClean="0"/>
-              <a:t>2024-03-19</a:t>
+              <a:t>2024-04-09</a:t>
             </a:fld>
             <a:endParaRPr lang="ko-KR" altLang="en-US"/>
           </a:p>
@@ -1149,7 +1154,7 @@
           <a:p>
             <a:fld id="{F64702D1-1DDD-4C5F-A560-D848F8B0A03E}" type="datetime1">
               <a:rPr lang="ko-KR" altLang="en-US" smtClean="0"/>
-              <a:t>2024-03-19</a:t>
+              <a:t>2024-04-09</a:t>
             </a:fld>
             <a:endParaRPr lang="ko-KR" altLang="en-US"/>
           </a:p>
@@ -1412,7 +1417,7 @@
           <a:p>
             <a:fld id="{B1630A40-B8E3-4B07-96B2-0A0496D85462}" type="datetime1">
               <a:rPr lang="ko-KR" altLang="en-US" smtClean="0"/>
-              <a:t>2024-03-19</a:t>
+              <a:t>2024-04-09</a:t>
             </a:fld>
             <a:endParaRPr lang="ko-KR" altLang="en-US"/>
           </a:p>
@@ -1651,7 +1656,7 @@
           <a:p>
             <a:fld id="{070816A2-BD0B-48A6-8771-F61A12C2CCDC}" type="datetime1">
               <a:rPr lang="ko-KR" altLang="en-US" smtClean="0"/>
-              <a:t>2024-03-19</a:t>
+              <a:t>2024-04-09</a:t>
             </a:fld>
             <a:endParaRPr lang="ko-KR" altLang="en-US"/>
           </a:p>
@@ -2025,7 +2030,7 @@
           <a:p>
             <a:fld id="{F1C79E17-C569-4517-AAF2-2753FE59427A}" type="datetime1">
               <a:rPr lang="ko-KR" altLang="en-US" smtClean="0"/>
-              <a:t>2024-03-19</a:t>
+              <a:t>2024-04-09</a:t>
             </a:fld>
             <a:endParaRPr lang="ko-KR" altLang="en-US"/>
           </a:p>
@@ -2150,7 +2155,7 @@
           <a:p>
             <a:fld id="{41F0635D-524B-4663-9BC9-C6ADC7E11725}" type="datetime1">
               <a:rPr lang="ko-KR" altLang="en-US" smtClean="0"/>
-              <a:t>2024-03-19</a:t>
+              <a:t>2024-04-09</a:t>
             </a:fld>
             <a:endParaRPr lang="ko-KR" altLang="en-US"/>
           </a:p>
@@ -2252,7 +2257,7 @@
           <a:p>
             <a:fld id="{F27D30BF-C775-450E-89AC-CB3CC697C266}" type="datetime1">
               <a:rPr lang="ko-KR" altLang="en-US" smtClean="0"/>
-              <a:t>2024-03-19</a:t>
+              <a:t>2024-04-09</a:t>
             </a:fld>
             <a:endParaRPr lang="ko-KR" altLang="en-US"/>
           </a:p>
@@ -2536,7 +2541,7 @@
           <a:p>
             <a:fld id="{0B9EB9A9-3D6F-4323-868A-2073DCA9B7C7}" type="datetime1">
               <a:rPr lang="ko-KR" altLang="en-US" smtClean="0"/>
-              <a:t>2024-03-19</a:t>
+              <a:t>2024-04-09</a:t>
             </a:fld>
             <a:endParaRPr lang="ko-KR" altLang="en-US"/>
           </a:p>
@@ -2800,7 +2805,7 @@
           <a:p>
             <a:fld id="{0AA9B903-11A0-4F32-BEEA-8500AE50112F}" type="datetime1">
               <a:rPr lang="ko-KR" altLang="en-US" smtClean="0"/>
-              <a:t>2024-03-19</a:t>
+              <a:t>2024-04-09</a:t>
             </a:fld>
             <a:endParaRPr lang="ko-KR" altLang="en-US"/>
           </a:p>
@@ -3020,7 +3025,7 @@
           <a:p>
             <a:fld id="{538B9CE5-2932-49D4-8C6B-AE2DEAF1F894}" type="datetime1">
               <a:rPr lang="ko-KR" altLang="en-US" smtClean="0"/>
-              <a:t>2024-03-19</a:t>
+              <a:t>2024-04-09</a:t>
             </a:fld>
             <a:endParaRPr lang="ko-KR" altLang="en-US"/>
           </a:p>
@@ -3581,95 +3586,688 @@
       </p:grpSpPr>
       <p:sp>
         <p:nvSpPr>
-          <p:cNvPr id="2" name="제목 1"/>
-          <p:cNvSpPr>
-            <a:spLocks noGrp="1"/>
-          </p:cNvSpPr>
-          <p:nvPr>
-            <p:ph type="ctrTitle"/>
-          </p:nvPr>
+          <p:cNvPr id="7" name="직사각형 6"/>
+          <p:cNvSpPr/>
+          <p:nvPr/>
         </p:nvSpPr>
         <p:spPr>
           <a:xfrm>
-            <a:off x="1524000" y="1114826"/>
-            <a:ext cx="9144000" cy="980757"/>
+            <a:off x="4143375" y="369932"/>
+            <a:ext cx="3867150" cy="5819775"/>
           </a:xfrm>
+          <a:prstGeom prst="rect">
+            <a:avLst/>
+          </a:prstGeom>
+          <a:solidFill>
+            <a:schemeClr val="bg1"/>
+          </a:solidFill>
+          <a:ln>
+            <a:noFill/>
+          </a:ln>
         </p:spPr>
+        <p:style>
+          <a:lnRef idx="2">
+            <a:schemeClr val="accent1">
+              <a:shade val="50000"/>
+            </a:schemeClr>
+          </a:lnRef>
+          <a:fillRef idx="1">
+            <a:schemeClr val="accent1"/>
+          </a:fillRef>
+          <a:effectRef idx="0">
+            <a:schemeClr val="accent1"/>
+          </a:effectRef>
+          <a:fontRef idx="minor">
+            <a:schemeClr val="lt1"/>
+          </a:fontRef>
+        </p:style>
+        <p:txBody>
+          <a:bodyPr rtlCol="0" anchor="ctr"/>
+          <a:lstStyle/>
+          <a:p>
+            <a:pPr algn="ctr"/>
+            <a:r>
+              <a:rPr lang="en-US" altLang="ko-KR" dirty="0" smtClean="0"/>
+              <a:t> </a:t>
+            </a:r>
+            <a:endParaRPr lang="ko-KR" altLang="en-US" dirty="0"/>
+          </a:p>
+        </p:txBody>
+      </p:sp>
+      <p:sp>
+        <p:nvSpPr>
+          <p:cNvPr id="5" name="슬라이드 번호 개체 틀 4"/>
+          <p:cNvSpPr>
+            <a:spLocks noGrp="1"/>
+          </p:cNvSpPr>
+          <p:nvPr>
+            <p:ph type="sldNum" sz="quarter" idx="12"/>
+          </p:nvPr>
+        </p:nvSpPr>
+        <p:spPr/>
         <p:txBody>
           <a:bodyPr/>
           <a:lstStyle/>
           <a:p>
-            <a:r>
-              <a:rPr lang="ko-KR" altLang="en-US" dirty="0" smtClean="0"/>
-              <a:t>앱 이름</a:t>
-            </a:r>
-            <a:endParaRPr lang="ko-KR" altLang="en-US" dirty="0"/>
-          </a:p>
-        </p:txBody>
-      </p:sp>
-      <p:sp>
-        <p:nvSpPr>
-          <p:cNvPr id="3" name="부제목 2"/>
-          <p:cNvSpPr>
-            <a:spLocks noGrp="1"/>
-          </p:cNvSpPr>
-          <p:nvPr>
-            <p:ph type="subTitle" idx="1"/>
-          </p:nvPr>
+            <a:fld id="{EE2F5D7C-E2DC-414A-BBFB-98B004858A36}" type="slidenum">
+              <a:rPr lang="ko-KR" altLang="en-US" smtClean="0"/>
+              <a:t>1</a:t>
+            </a:fld>
+            <a:endParaRPr lang="ko-KR" altLang="en-US"/>
+          </a:p>
+        </p:txBody>
+      </p:sp>
+      <p:sp>
+        <p:nvSpPr>
+          <p:cNvPr id="8" name="직사각형 7"/>
+          <p:cNvSpPr/>
+          <p:nvPr/>
         </p:nvSpPr>
         <p:spPr>
           <a:xfrm>
-            <a:off x="1524000" y="2195268"/>
-            <a:ext cx="9144000" cy="1655762"/>
+            <a:off x="4860925" y="3669612"/>
+            <a:ext cx="2432050" cy="307975"/>
           </a:xfrm>
+          <a:prstGeom prst="rect">
+            <a:avLst/>
+          </a:prstGeom>
+          <a:solidFill>
+            <a:schemeClr val="bg1"/>
+          </a:solidFill>
+          <a:ln>
+            <a:solidFill>
+              <a:schemeClr val="tx1"/>
+            </a:solidFill>
+          </a:ln>
         </p:spPr>
-        <p:txBody>
-          <a:bodyPr/>
-          <a:lstStyle/>
-          <a:p>
+        <p:style>
+          <a:lnRef idx="2">
+            <a:schemeClr val="accent1">
+              <a:shade val="50000"/>
+            </a:schemeClr>
+          </a:lnRef>
+          <a:fillRef idx="1">
+            <a:schemeClr val="accent1"/>
+          </a:fillRef>
+          <a:effectRef idx="0">
+            <a:schemeClr val="accent1"/>
+          </a:effectRef>
+          <a:fontRef idx="minor">
+            <a:schemeClr val="lt1"/>
+          </a:fontRef>
+        </p:style>
+        <p:txBody>
+          <a:bodyPr rtlCol="0" anchor="ctr"/>
+          <a:lstStyle/>
+          <a:p>
+            <a:r>
+              <a:rPr lang="en-US" altLang="ko-KR" dirty="0" smtClean="0"/>
+              <a:t> ID</a:t>
+            </a:r>
             <a:endParaRPr lang="ko-KR" altLang="en-US" dirty="0"/>
           </a:p>
         </p:txBody>
       </p:sp>
       <p:sp>
         <p:nvSpPr>
-          <p:cNvPr id="4" name="바닥글 개체 틀 3"/>
-          <p:cNvSpPr>
-            <a:spLocks noGrp="1"/>
-          </p:cNvSpPr>
-          <p:nvPr>
-            <p:ph type="ftr" sz="quarter" idx="11"/>
-          </p:nvPr>
-        </p:nvSpPr>
-        <p:spPr/>
-        <p:txBody>
-          <a:bodyPr/>
-          <a:lstStyle/>
-          <a:p>
-            <a:endParaRPr lang="ko-KR" altLang="en-US"/>
-          </a:p>
-        </p:txBody>
-      </p:sp>
-      <p:sp>
-        <p:nvSpPr>
-          <p:cNvPr id="5" name="슬라이드 번호 개체 틀 4"/>
-          <p:cNvSpPr>
-            <a:spLocks noGrp="1"/>
-          </p:cNvSpPr>
-          <p:nvPr>
-            <p:ph type="sldNum" sz="quarter" idx="12"/>
-          </p:nvPr>
-        </p:nvSpPr>
-        <p:spPr/>
-        <p:txBody>
-          <a:bodyPr/>
-          <a:lstStyle/>
-          <a:p>
-            <a:fld id="{EE2F5D7C-E2DC-414A-BBFB-98B004858A36}" type="slidenum">
-              <a:rPr lang="ko-KR" altLang="en-US" smtClean="0"/>
-              <a:t>1</a:t>
-            </a:fld>
-            <a:endParaRPr lang="ko-KR" altLang="en-US"/>
+          <p:cNvPr id="9" name="직사각형 8"/>
+          <p:cNvSpPr/>
+          <p:nvPr/>
+        </p:nvSpPr>
+        <p:spPr>
+          <a:xfrm>
+            <a:off x="4860925" y="4250637"/>
+            <a:ext cx="2432050" cy="307975"/>
+          </a:xfrm>
+          <a:prstGeom prst="rect">
+            <a:avLst/>
+          </a:prstGeom>
+          <a:solidFill>
+            <a:schemeClr val="bg1"/>
+          </a:solidFill>
+          <a:ln>
+            <a:solidFill>
+              <a:schemeClr val="tx1"/>
+            </a:solidFill>
+          </a:ln>
+        </p:spPr>
+        <p:style>
+          <a:lnRef idx="2">
+            <a:schemeClr val="accent1">
+              <a:shade val="50000"/>
+            </a:schemeClr>
+          </a:lnRef>
+          <a:fillRef idx="1">
+            <a:schemeClr val="accent1"/>
+          </a:fillRef>
+          <a:effectRef idx="0">
+            <a:schemeClr val="accent1"/>
+          </a:effectRef>
+          <a:fontRef idx="minor">
+            <a:schemeClr val="lt1"/>
+          </a:fontRef>
+        </p:style>
+        <p:txBody>
+          <a:bodyPr rtlCol="0" anchor="ctr"/>
+          <a:lstStyle/>
+          <a:p>
+            <a:r>
+              <a:rPr lang="en-US" altLang="ko-KR" dirty="0" smtClean="0"/>
+              <a:t> PW</a:t>
+            </a:r>
+            <a:endParaRPr lang="ko-KR" altLang="en-US" dirty="0"/>
+          </a:p>
+        </p:txBody>
+      </p:sp>
+      <p:sp>
+        <p:nvSpPr>
+          <p:cNvPr id="10" name="타원 9"/>
+          <p:cNvSpPr/>
+          <p:nvPr/>
+        </p:nvSpPr>
+        <p:spPr>
+          <a:xfrm>
+            <a:off x="5419725" y="1485900"/>
+            <a:ext cx="1304925" cy="1304925"/>
+          </a:xfrm>
+          <a:prstGeom prst="ellipse">
+            <a:avLst/>
+          </a:prstGeom>
+          <a:solidFill>
+            <a:schemeClr val="bg1"/>
+          </a:solidFill>
+          <a:ln>
+            <a:solidFill>
+              <a:srgbClr val="FFFF00"/>
+            </a:solidFill>
+          </a:ln>
+        </p:spPr>
+        <p:style>
+          <a:lnRef idx="2">
+            <a:schemeClr val="accent1">
+              <a:shade val="50000"/>
+            </a:schemeClr>
+          </a:lnRef>
+          <a:fillRef idx="1">
+            <a:schemeClr val="accent1"/>
+          </a:fillRef>
+          <a:effectRef idx="0">
+            <a:schemeClr val="accent1"/>
+          </a:effectRef>
+          <a:fontRef idx="minor">
+            <a:schemeClr val="lt1"/>
+          </a:fontRef>
+        </p:style>
+        <p:txBody>
+          <a:bodyPr rtlCol="0" anchor="ctr"/>
+          <a:lstStyle/>
+          <a:p>
+            <a:pPr algn="ctr"/>
+            <a:r>
+              <a:rPr lang="ko-KR" altLang="en-US" dirty="0" smtClean="0"/>
+              <a:t>로고</a:t>
+            </a:r>
+            <a:endParaRPr lang="ko-KR" altLang="en-US" dirty="0"/>
+          </a:p>
+        </p:txBody>
+      </p:sp>
+      <p:sp>
+        <p:nvSpPr>
+          <p:cNvPr id="11" name="직사각형 10"/>
+          <p:cNvSpPr/>
+          <p:nvPr/>
+        </p:nvSpPr>
+        <p:spPr>
+          <a:xfrm>
+            <a:off x="4143375" y="6163185"/>
+            <a:ext cx="3867150" cy="483499"/>
+          </a:xfrm>
+          <a:prstGeom prst="rect">
+            <a:avLst/>
+          </a:prstGeom>
+          <a:solidFill>
+            <a:schemeClr val="bg1">
+              <a:lumMod val="95000"/>
+              <a:lumOff val="5000"/>
+            </a:schemeClr>
+          </a:solidFill>
+          <a:ln>
+            <a:noFill/>
+          </a:ln>
+        </p:spPr>
+        <p:style>
+          <a:lnRef idx="2">
+            <a:schemeClr val="accent1">
+              <a:shade val="50000"/>
+            </a:schemeClr>
+          </a:lnRef>
+          <a:fillRef idx="1">
+            <a:schemeClr val="accent1"/>
+          </a:fillRef>
+          <a:effectRef idx="0">
+            <a:schemeClr val="accent1"/>
+          </a:effectRef>
+          <a:fontRef idx="minor">
+            <a:schemeClr val="lt1"/>
+          </a:fontRef>
+        </p:style>
+        <p:txBody>
+          <a:bodyPr rtlCol="0" anchor="ctr"/>
+          <a:lstStyle/>
+          <a:p>
+            <a:pPr algn="ctr"/>
+            <a:endParaRPr lang="ko-KR" altLang="en-US"/>
+          </a:p>
+        </p:txBody>
+      </p:sp>
+      <p:sp>
+        <p:nvSpPr>
+          <p:cNvPr id="13" name="이등변 삼각형 12"/>
+          <p:cNvSpPr/>
+          <p:nvPr/>
+        </p:nvSpPr>
+        <p:spPr>
+          <a:xfrm rot="16200000">
+            <a:off x="7052739" y="6309301"/>
+            <a:ext cx="225184" cy="194124"/>
+          </a:xfrm>
+          <a:prstGeom prst="triangle">
+            <a:avLst/>
+          </a:prstGeom>
+          <a:solidFill>
+            <a:schemeClr val="bg1"/>
+          </a:solidFill>
+          <a:ln>
+            <a:solidFill>
+              <a:schemeClr val="tx1"/>
+            </a:solidFill>
+          </a:ln>
+        </p:spPr>
+        <p:style>
+          <a:lnRef idx="2">
+            <a:schemeClr val="accent1">
+              <a:shade val="50000"/>
+            </a:schemeClr>
+          </a:lnRef>
+          <a:fillRef idx="1">
+            <a:schemeClr val="accent1"/>
+          </a:fillRef>
+          <a:effectRef idx="0">
+            <a:schemeClr val="accent1"/>
+          </a:effectRef>
+          <a:fontRef idx="minor">
+            <a:schemeClr val="lt1"/>
+          </a:fontRef>
+        </p:style>
+        <p:txBody>
+          <a:bodyPr rtlCol="0" anchor="ctr"/>
+          <a:lstStyle/>
+          <a:p>
+            <a:pPr algn="ctr"/>
+            <a:endParaRPr lang="ko-KR" altLang="en-US" dirty="0"/>
+          </a:p>
+        </p:txBody>
+      </p:sp>
+      <p:sp>
+        <p:nvSpPr>
+          <p:cNvPr id="14" name="모서리가 둥근 직사각형 13"/>
+          <p:cNvSpPr/>
+          <p:nvPr/>
+        </p:nvSpPr>
+        <p:spPr>
+          <a:xfrm>
+            <a:off x="5954109" y="6287848"/>
+            <a:ext cx="233363" cy="233363"/>
+          </a:xfrm>
+          <a:prstGeom prst="roundRect">
+            <a:avLst/>
+          </a:prstGeom>
+          <a:solidFill>
+            <a:schemeClr val="bg1"/>
+          </a:solidFill>
+          <a:ln>
+            <a:solidFill>
+              <a:schemeClr val="tx1"/>
+            </a:solidFill>
+          </a:ln>
+        </p:spPr>
+        <p:style>
+          <a:lnRef idx="2">
+            <a:schemeClr val="accent1">
+              <a:shade val="50000"/>
+            </a:schemeClr>
+          </a:lnRef>
+          <a:fillRef idx="1">
+            <a:schemeClr val="accent1"/>
+          </a:fillRef>
+          <a:effectRef idx="0">
+            <a:schemeClr val="accent1"/>
+          </a:effectRef>
+          <a:fontRef idx="minor">
+            <a:schemeClr val="lt1"/>
+          </a:fontRef>
+        </p:style>
+        <p:txBody>
+          <a:bodyPr rtlCol="0" anchor="ctr"/>
+          <a:lstStyle/>
+          <a:p>
+            <a:pPr algn="ctr"/>
+            <a:endParaRPr lang="ko-KR" altLang="en-US"/>
+          </a:p>
+        </p:txBody>
+      </p:sp>
+      <p:grpSp>
+        <p:nvGrpSpPr>
+          <p:cNvPr id="22" name="그룹 21"/>
+          <p:cNvGrpSpPr/>
+          <p:nvPr/>
+        </p:nvGrpSpPr>
+        <p:grpSpPr>
+          <a:xfrm rot="5400000">
+            <a:off x="4847320" y="6301452"/>
+            <a:ext cx="233364" cy="206155"/>
+            <a:chOff x="4860924" y="6330259"/>
+            <a:chExt cx="233364" cy="206155"/>
+          </a:xfrm>
+        </p:grpSpPr>
+        <p:sp>
+          <p:nvSpPr>
+            <p:cNvPr id="15" name="모서리가 둥근 직사각형 14"/>
+            <p:cNvSpPr/>
+            <p:nvPr/>
+          </p:nvSpPr>
+          <p:spPr>
+            <a:xfrm>
+              <a:off x="4860925" y="6330259"/>
+              <a:ext cx="233363" cy="45719"/>
+            </a:xfrm>
+            <a:prstGeom prst="roundRect">
+              <a:avLst/>
+            </a:prstGeom>
+            <a:solidFill>
+              <a:schemeClr val="bg1"/>
+            </a:solidFill>
+            <a:ln>
+              <a:solidFill>
+                <a:schemeClr val="tx1"/>
+              </a:solidFill>
+            </a:ln>
+          </p:spPr>
+          <p:style>
+            <a:lnRef idx="2">
+              <a:schemeClr val="accent1">
+                <a:shade val="50000"/>
+              </a:schemeClr>
+            </a:lnRef>
+            <a:fillRef idx="1">
+              <a:schemeClr val="accent1"/>
+            </a:fillRef>
+            <a:effectRef idx="0">
+              <a:schemeClr val="accent1"/>
+            </a:effectRef>
+            <a:fontRef idx="minor">
+              <a:schemeClr val="lt1"/>
+            </a:fontRef>
+          </p:style>
+          <p:txBody>
+            <a:bodyPr rtlCol="0" anchor="ctr"/>
+            <a:lstStyle/>
+            <a:p>
+              <a:pPr algn="ctr"/>
+              <a:endParaRPr lang="ko-KR" altLang="en-US"/>
+            </a:p>
+          </p:txBody>
+        </p:sp>
+        <p:sp>
+          <p:nvSpPr>
+            <p:cNvPr id="16" name="모서리가 둥근 직사각형 15"/>
+            <p:cNvSpPr/>
+            <p:nvPr/>
+          </p:nvSpPr>
+          <p:spPr>
+            <a:xfrm>
+              <a:off x="4860924" y="6408694"/>
+              <a:ext cx="233363" cy="45719"/>
+            </a:xfrm>
+            <a:prstGeom prst="roundRect">
+              <a:avLst/>
+            </a:prstGeom>
+            <a:solidFill>
+              <a:schemeClr val="bg1"/>
+            </a:solidFill>
+            <a:ln>
+              <a:solidFill>
+                <a:schemeClr val="tx1"/>
+              </a:solidFill>
+            </a:ln>
+          </p:spPr>
+          <p:style>
+            <a:lnRef idx="2">
+              <a:schemeClr val="accent1">
+                <a:shade val="50000"/>
+              </a:schemeClr>
+            </a:lnRef>
+            <a:fillRef idx="1">
+              <a:schemeClr val="accent1"/>
+            </a:fillRef>
+            <a:effectRef idx="0">
+              <a:schemeClr val="accent1"/>
+            </a:effectRef>
+            <a:fontRef idx="minor">
+              <a:schemeClr val="lt1"/>
+            </a:fontRef>
+          </p:style>
+          <p:txBody>
+            <a:bodyPr rtlCol="0" anchor="ctr"/>
+            <a:lstStyle/>
+            <a:p>
+              <a:pPr algn="ctr"/>
+              <a:endParaRPr lang="ko-KR" altLang="en-US"/>
+            </a:p>
+          </p:txBody>
+        </p:sp>
+        <p:sp>
+          <p:nvSpPr>
+            <p:cNvPr id="17" name="모서리가 둥근 직사각형 16"/>
+            <p:cNvSpPr/>
+            <p:nvPr/>
+          </p:nvSpPr>
+          <p:spPr>
+            <a:xfrm>
+              <a:off x="4860925" y="6490695"/>
+              <a:ext cx="233363" cy="45719"/>
+            </a:xfrm>
+            <a:prstGeom prst="roundRect">
+              <a:avLst/>
+            </a:prstGeom>
+            <a:solidFill>
+              <a:schemeClr val="bg1"/>
+            </a:solidFill>
+            <a:ln>
+              <a:solidFill>
+                <a:schemeClr val="tx1"/>
+              </a:solidFill>
+            </a:ln>
+          </p:spPr>
+          <p:style>
+            <a:lnRef idx="2">
+              <a:schemeClr val="accent1">
+                <a:shade val="50000"/>
+              </a:schemeClr>
+            </a:lnRef>
+            <a:fillRef idx="1">
+              <a:schemeClr val="accent1"/>
+            </a:fillRef>
+            <a:effectRef idx="0">
+              <a:schemeClr val="accent1"/>
+            </a:effectRef>
+            <a:fontRef idx="minor">
+              <a:schemeClr val="lt1"/>
+            </a:fontRef>
+          </p:style>
+          <p:txBody>
+            <a:bodyPr rtlCol="0" anchor="ctr"/>
+            <a:lstStyle/>
+            <a:p>
+              <a:pPr algn="ctr"/>
+              <a:endParaRPr lang="ko-KR" altLang="en-US"/>
+            </a:p>
+          </p:txBody>
+        </p:sp>
+      </p:grpSp>
+      <p:sp>
+        <p:nvSpPr>
+          <p:cNvPr id="23" name="직사각형 22"/>
+          <p:cNvSpPr/>
+          <p:nvPr/>
+        </p:nvSpPr>
+        <p:spPr>
+          <a:xfrm>
+            <a:off x="5588058" y="4822435"/>
+            <a:ext cx="965464" cy="307975"/>
+          </a:xfrm>
+          <a:prstGeom prst="rect">
+            <a:avLst/>
+          </a:prstGeom>
+          <a:solidFill>
+            <a:schemeClr val="bg1"/>
+          </a:solidFill>
+          <a:ln>
+            <a:solidFill>
+              <a:schemeClr val="tx1"/>
+            </a:solidFill>
+          </a:ln>
+        </p:spPr>
+        <p:style>
+          <a:lnRef idx="2">
+            <a:schemeClr val="accent1">
+              <a:shade val="50000"/>
+            </a:schemeClr>
+          </a:lnRef>
+          <a:fillRef idx="1">
+            <a:schemeClr val="accent1"/>
+          </a:fillRef>
+          <a:effectRef idx="0">
+            <a:schemeClr val="accent1"/>
+          </a:effectRef>
+          <a:fontRef idx="minor">
+            <a:schemeClr val="lt1"/>
+          </a:fontRef>
+        </p:style>
+        <p:txBody>
+          <a:bodyPr rtlCol="0" anchor="ctr"/>
+          <a:lstStyle/>
+          <a:p>
+            <a:pPr algn="ctr"/>
+            <a:r>
+              <a:rPr lang="ko-KR" altLang="en-US" dirty="0" smtClean="0"/>
+              <a:t>로그인</a:t>
+            </a:r>
+            <a:endParaRPr lang="ko-KR" altLang="en-US" dirty="0"/>
+          </a:p>
+        </p:txBody>
+      </p:sp>
+      <p:sp>
+        <p:nvSpPr>
+          <p:cNvPr id="25" name="직사각형 24"/>
+          <p:cNvSpPr/>
+          <p:nvPr/>
+        </p:nvSpPr>
+        <p:spPr>
+          <a:xfrm>
+            <a:off x="4860925" y="5652152"/>
+            <a:ext cx="965464" cy="307975"/>
+          </a:xfrm>
+          <a:prstGeom prst="rect">
+            <a:avLst/>
+          </a:prstGeom>
+          <a:solidFill>
+            <a:schemeClr val="bg1"/>
+          </a:solidFill>
+          <a:ln>
+            <a:solidFill>
+              <a:schemeClr val="tx1"/>
+            </a:solidFill>
+          </a:ln>
+        </p:spPr>
+        <p:style>
+          <a:lnRef idx="2">
+            <a:schemeClr val="accent1">
+              <a:shade val="50000"/>
+            </a:schemeClr>
+          </a:lnRef>
+          <a:fillRef idx="1">
+            <a:schemeClr val="accent1"/>
+          </a:fillRef>
+          <a:effectRef idx="0">
+            <a:schemeClr val="accent1"/>
+          </a:effectRef>
+          <a:fontRef idx="minor">
+            <a:schemeClr val="lt1"/>
+          </a:fontRef>
+        </p:style>
+        <p:txBody>
+          <a:bodyPr rtlCol="0" anchor="ctr"/>
+          <a:lstStyle/>
+          <a:p>
+            <a:pPr algn="ctr"/>
+            <a:r>
+              <a:rPr lang="ko-KR" altLang="en-US" sz="1200" dirty="0" smtClean="0"/>
+              <a:t>회원가입</a:t>
+            </a:r>
+            <a:endParaRPr lang="ko-KR" altLang="en-US" sz="1200" dirty="0"/>
+          </a:p>
+        </p:txBody>
+      </p:sp>
+      <p:sp>
+        <p:nvSpPr>
+          <p:cNvPr id="26" name="직사각형 25"/>
+          <p:cNvSpPr/>
+          <p:nvPr/>
+        </p:nvSpPr>
+        <p:spPr>
+          <a:xfrm>
+            <a:off x="6325642" y="5652152"/>
+            <a:ext cx="965464" cy="307975"/>
+          </a:xfrm>
+          <a:prstGeom prst="rect">
+            <a:avLst/>
+          </a:prstGeom>
+          <a:solidFill>
+            <a:schemeClr val="bg1"/>
+          </a:solidFill>
+          <a:ln>
+            <a:solidFill>
+              <a:schemeClr val="tx1"/>
+            </a:solidFill>
+          </a:ln>
+        </p:spPr>
+        <p:style>
+          <a:lnRef idx="2">
+            <a:schemeClr val="accent1">
+              <a:shade val="50000"/>
+            </a:schemeClr>
+          </a:lnRef>
+          <a:fillRef idx="1">
+            <a:schemeClr val="accent1"/>
+          </a:fillRef>
+          <a:effectRef idx="0">
+            <a:schemeClr val="accent1"/>
+          </a:effectRef>
+          <a:fontRef idx="minor">
+            <a:schemeClr val="lt1"/>
+          </a:fontRef>
+        </p:style>
+        <p:txBody>
+          <a:bodyPr rtlCol="0" anchor="ctr"/>
+          <a:lstStyle/>
+          <a:p>
+            <a:pPr algn="ctr"/>
+            <a:r>
+              <a:rPr lang="ko-KR" altLang="en-US" sz="1200" dirty="0" smtClean="0"/>
+              <a:t>고객센터</a:t>
+            </a:r>
+            <a:endParaRPr lang="en-US" altLang="ko-KR" sz="1200" dirty="0" smtClean="0"/>
           </a:p>
         </p:txBody>
       </p:sp>
@@ -3712,63 +4310,6 @@
       </p:grpSpPr>
       <p:sp>
         <p:nvSpPr>
-          <p:cNvPr id="2" name="제목 1"/>
-          <p:cNvSpPr>
-            <a:spLocks noGrp="1"/>
-          </p:cNvSpPr>
-          <p:nvPr>
-            <p:ph type="title"/>
-          </p:nvPr>
-        </p:nvSpPr>
-        <p:spPr/>
-        <p:txBody>
-          <a:bodyPr/>
-          <a:lstStyle/>
-          <a:p>
-            <a:endParaRPr lang="ko-KR" altLang="en-US"/>
-          </a:p>
-        </p:txBody>
-      </p:sp>
-      <p:sp>
-        <p:nvSpPr>
-          <p:cNvPr id="3" name="내용 개체 틀 2"/>
-          <p:cNvSpPr>
-            <a:spLocks noGrp="1"/>
-          </p:cNvSpPr>
-          <p:nvPr>
-            <p:ph idx="1"/>
-          </p:nvPr>
-        </p:nvSpPr>
-        <p:spPr/>
-        <p:txBody>
-          <a:bodyPr/>
-          <a:lstStyle/>
-          <a:p>
-            <a:endParaRPr lang="ko-KR" altLang="en-US" dirty="0"/>
-          </a:p>
-        </p:txBody>
-      </p:sp>
-      <p:sp>
-        <p:nvSpPr>
-          <p:cNvPr id="4" name="바닥글 개체 틀 3"/>
-          <p:cNvSpPr>
-            <a:spLocks noGrp="1"/>
-          </p:cNvSpPr>
-          <p:nvPr>
-            <p:ph type="ftr" sz="quarter" idx="11"/>
-          </p:nvPr>
-        </p:nvSpPr>
-        <p:spPr/>
-        <p:txBody>
-          <a:bodyPr/>
-          <a:lstStyle/>
-          <a:p>
-            <a:endParaRPr lang="ko-KR" altLang="en-US"/>
-          </a:p>
-        </p:txBody>
-      </p:sp>
-      <p:sp>
-        <p:nvSpPr>
           <p:cNvPr id="5" name="슬라이드 번호 개체 틀 4"/>
           <p:cNvSpPr>
             <a:spLocks noGrp="1"/>
@@ -3790,16 +4331,392 @@
           </a:p>
         </p:txBody>
       </p:sp>
+      <p:grpSp>
+        <p:nvGrpSpPr>
+          <p:cNvPr id="3" name="그룹 2"/>
+          <p:cNvGrpSpPr/>
+          <p:nvPr/>
+        </p:nvGrpSpPr>
+        <p:grpSpPr>
+          <a:xfrm>
+            <a:off x="3226760" y="258298"/>
+            <a:ext cx="3867150" cy="6276752"/>
+            <a:chOff x="3226760" y="258298"/>
+            <a:chExt cx="3867150" cy="6276752"/>
+          </a:xfrm>
+        </p:grpSpPr>
+        <p:sp>
+          <p:nvSpPr>
+            <p:cNvPr id="19" name="직사각형 18"/>
+            <p:cNvSpPr/>
+            <p:nvPr/>
+          </p:nvSpPr>
+          <p:spPr>
+            <a:xfrm>
+              <a:off x="3226760" y="258298"/>
+              <a:ext cx="3867150" cy="5819775"/>
+            </a:xfrm>
+            <a:prstGeom prst="rect">
+              <a:avLst/>
+            </a:prstGeom>
+            <a:solidFill>
+              <a:schemeClr val="bg1"/>
+            </a:solidFill>
+            <a:ln>
+              <a:noFill/>
+            </a:ln>
+          </p:spPr>
+          <p:style>
+            <a:lnRef idx="2">
+              <a:schemeClr val="accent1">
+                <a:shade val="50000"/>
+              </a:schemeClr>
+            </a:lnRef>
+            <a:fillRef idx="1">
+              <a:schemeClr val="accent1"/>
+            </a:fillRef>
+            <a:effectRef idx="0">
+              <a:schemeClr val="accent1"/>
+            </a:effectRef>
+            <a:fontRef idx="minor">
+              <a:schemeClr val="lt1"/>
+            </a:fontRef>
+          </p:style>
+          <p:txBody>
+            <a:bodyPr rtlCol="0" anchor="ctr"/>
+            <a:lstStyle/>
+            <a:p>
+              <a:pPr algn="ctr"/>
+              <a:r>
+                <a:rPr lang="en-US" altLang="ko-KR" dirty="0" smtClean="0"/>
+                <a:t> </a:t>
+              </a:r>
+              <a:endParaRPr lang="ko-KR" altLang="en-US" dirty="0"/>
+            </a:p>
+          </p:txBody>
+        </p:sp>
+        <p:sp>
+          <p:nvSpPr>
+            <p:cNvPr id="20" name="직사각형 19"/>
+            <p:cNvSpPr/>
+            <p:nvPr/>
+          </p:nvSpPr>
+          <p:spPr>
+            <a:xfrm>
+              <a:off x="3226760" y="6051551"/>
+              <a:ext cx="3867150" cy="483499"/>
+            </a:xfrm>
+            <a:prstGeom prst="rect">
+              <a:avLst/>
+            </a:prstGeom>
+            <a:solidFill>
+              <a:schemeClr val="bg1">
+                <a:lumMod val="95000"/>
+                <a:lumOff val="5000"/>
+              </a:schemeClr>
+            </a:solidFill>
+            <a:ln>
+              <a:noFill/>
+            </a:ln>
+          </p:spPr>
+          <p:style>
+            <a:lnRef idx="2">
+              <a:schemeClr val="accent1">
+                <a:shade val="50000"/>
+              </a:schemeClr>
+            </a:lnRef>
+            <a:fillRef idx="1">
+              <a:schemeClr val="accent1"/>
+            </a:fillRef>
+            <a:effectRef idx="0">
+              <a:schemeClr val="accent1"/>
+            </a:effectRef>
+            <a:fontRef idx="minor">
+              <a:schemeClr val="lt1"/>
+            </a:fontRef>
+          </p:style>
+          <p:txBody>
+            <a:bodyPr rtlCol="0" anchor="ctr"/>
+            <a:lstStyle/>
+            <a:p>
+              <a:pPr algn="ctr"/>
+              <a:endParaRPr lang="ko-KR" altLang="en-US"/>
+            </a:p>
+          </p:txBody>
+        </p:sp>
+        <p:sp>
+          <p:nvSpPr>
+            <p:cNvPr id="21" name="이등변 삼각형 20"/>
+            <p:cNvSpPr/>
+            <p:nvPr/>
+          </p:nvSpPr>
+          <p:spPr>
+            <a:xfrm rot="16200000">
+              <a:off x="6145649" y="6197667"/>
+              <a:ext cx="225184" cy="194124"/>
+            </a:xfrm>
+            <a:prstGeom prst="triangle">
+              <a:avLst/>
+            </a:prstGeom>
+            <a:solidFill>
+              <a:schemeClr val="bg1"/>
+            </a:solidFill>
+            <a:ln>
+              <a:solidFill>
+                <a:schemeClr val="tx1"/>
+              </a:solidFill>
+            </a:ln>
+          </p:spPr>
+          <p:style>
+            <a:lnRef idx="2">
+              <a:schemeClr val="accent1">
+                <a:shade val="50000"/>
+              </a:schemeClr>
+            </a:lnRef>
+            <a:fillRef idx="1">
+              <a:schemeClr val="accent1"/>
+            </a:fillRef>
+            <a:effectRef idx="0">
+              <a:schemeClr val="accent1"/>
+            </a:effectRef>
+            <a:fontRef idx="minor">
+              <a:schemeClr val="lt1"/>
+            </a:fontRef>
+          </p:style>
+          <p:txBody>
+            <a:bodyPr rtlCol="0" anchor="ctr"/>
+            <a:lstStyle/>
+            <a:p>
+              <a:pPr algn="ctr"/>
+              <a:endParaRPr lang="ko-KR" altLang="en-US" dirty="0"/>
+            </a:p>
+          </p:txBody>
+        </p:sp>
+        <p:sp>
+          <p:nvSpPr>
+            <p:cNvPr id="24" name="모서리가 둥근 직사각형 23"/>
+            <p:cNvSpPr/>
+            <p:nvPr/>
+          </p:nvSpPr>
+          <p:spPr>
+            <a:xfrm>
+              <a:off x="5037494" y="6176214"/>
+              <a:ext cx="233363" cy="233363"/>
+            </a:xfrm>
+            <a:prstGeom prst="roundRect">
+              <a:avLst/>
+            </a:prstGeom>
+            <a:solidFill>
+              <a:schemeClr val="bg1"/>
+            </a:solidFill>
+            <a:ln>
+              <a:solidFill>
+                <a:schemeClr val="tx1"/>
+              </a:solidFill>
+            </a:ln>
+          </p:spPr>
+          <p:style>
+            <a:lnRef idx="2">
+              <a:schemeClr val="accent1">
+                <a:shade val="50000"/>
+              </a:schemeClr>
+            </a:lnRef>
+            <a:fillRef idx="1">
+              <a:schemeClr val="accent1"/>
+            </a:fillRef>
+            <a:effectRef idx="0">
+              <a:schemeClr val="accent1"/>
+            </a:effectRef>
+            <a:fontRef idx="minor">
+              <a:schemeClr val="lt1"/>
+            </a:fontRef>
+          </p:style>
+          <p:txBody>
+            <a:bodyPr rtlCol="0" anchor="ctr"/>
+            <a:lstStyle/>
+            <a:p>
+              <a:pPr algn="ctr"/>
+              <a:endParaRPr lang="ko-KR" altLang="en-US"/>
+            </a:p>
+          </p:txBody>
+        </p:sp>
+        <p:grpSp>
+          <p:nvGrpSpPr>
+            <p:cNvPr id="27" name="그룹 26"/>
+            <p:cNvGrpSpPr/>
+            <p:nvPr/>
+          </p:nvGrpSpPr>
+          <p:grpSpPr>
+            <a:xfrm rot="5400000">
+              <a:off x="3930705" y="6189818"/>
+              <a:ext cx="233364" cy="206155"/>
+              <a:chOff x="4860924" y="6330259"/>
+              <a:chExt cx="233364" cy="206155"/>
+            </a:xfrm>
+          </p:grpSpPr>
+          <p:sp>
+            <p:nvSpPr>
+              <p:cNvPr id="28" name="모서리가 둥근 직사각형 27"/>
+              <p:cNvSpPr/>
+              <p:nvPr/>
+            </p:nvSpPr>
+            <p:spPr>
+              <a:xfrm>
+                <a:off x="4860925" y="6330259"/>
+                <a:ext cx="233363" cy="45719"/>
+              </a:xfrm>
+              <a:prstGeom prst="roundRect">
+                <a:avLst/>
+              </a:prstGeom>
+              <a:solidFill>
+                <a:schemeClr val="bg1"/>
+              </a:solidFill>
+              <a:ln>
+                <a:solidFill>
+                  <a:schemeClr val="tx1"/>
+                </a:solidFill>
+              </a:ln>
+            </p:spPr>
+            <p:style>
+              <a:lnRef idx="2">
+                <a:schemeClr val="accent1">
+                  <a:shade val="50000"/>
+                </a:schemeClr>
+              </a:lnRef>
+              <a:fillRef idx="1">
+                <a:schemeClr val="accent1"/>
+              </a:fillRef>
+              <a:effectRef idx="0">
+                <a:schemeClr val="accent1"/>
+              </a:effectRef>
+              <a:fontRef idx="minor">
+                <a:schemeClr val="lt1"/>
+              </a:fontRef>
+            </p:style>
+            <p:txBody>
+              <a:bodyPr rtlCol="0" anchor="ctr"/>
+              <a:lstStyle/>
+              <a:p>
+                <a:pPr algn="ctr"/>
+                <a:endParaRPr lang="ko-KR" altLang="en-US"/>
+              </a:p>
+            </p:txBody>
+          </p:sp>
+          <p:sp>
+            <p:nvSpPr>
+              <p:cNvPr id="29" name="모서리가 둥근 직사각형 28"/>
+              <p:cNvSpPr/>
+              <p:nvPr/>
+            </p:nvSpPr>
+            <p:spPr>
+              <a:xfrm>
+                <a:off x="4860924" y="6408694"/>
+                <a:ext cx="233363" cy="45719"/>
+              </a:xfrm>
+              <a:prstGeom prst="roundRect">
+                <a:avLst/>
+              </a:prstGeom>
+              <a:solidFill>
+                <a:schemeClr val="bg1"/>
+              </a:solidFill>
+              <a:ln>
+                <a:solidFill>
+                  <a:schemeClr val="tx1"/>
+                </a:solidFill>
+              </a:ln>
+            </p:spPr>
+            <p:style>
+              <a:lnRef idx="2">
+                <a:schemeClr val="accent1">
+                  <a:shade val="50000"/>
+                </a:schemeClr>
+              </a:lnRef>
+              <a:fillRef idx="1">
+                <a:schemeClr val="accent1"/>
+              </a:fillRef>
+              <a:effectRef idx="0">
+                <a:schemeClr val="accent1"/>
+              </a:effectRef>
+              <a:fontRef idx="minor">
+                <a:schemeClr val="lt1"/>
+              </a:fontRef>
+            </p:style>
+            <p:txBody>
+              <a:bodyPr rtlCol="0" anchor="ctr"/>
+              <a:lstStyle/>
+              <a:p>
+                <a:pPr algn="ctr"/>
+                <a:endParaRPr lang="ko-KR" altLang="en-US"/>
+              </a:p>
+            </p:txBody>
+          </p:sp>
+          <p:sp>
+            <p:nvSpPr>
+              <p:cNvPr id="30" name="모서리가 둥근 직사각형 29"/>
+              <p:cNvSpPr/>
+              <p:nvPr/>
+            </p:nvSpPr>
+            <p:spPr>
+              <a:xfrm>
+                <a:off x="4860925" y="6490695"/>
+                <a:ext cx="233363" cy="45719"/>
+              </a:xfrm>
+              <a:prstGeom prst="roundRect">
+                <a:avLst/>
+              </a:prstGeom>
+              <a:solidFill>
+                <a:schemeClr val="bg1"/>
+              </a:solidFill>
+              <a:ln>
+                <a:solidFill>
+                  <a:schemeClr val="tx1"/>
+                </a:solidFill>
+              </a:ln>
+            </p:spPr>
+            <p:style>
+              <a:lnRef idx="2">
+                <a:schemeClr val="accent1">
+                  <a:shade val="50000"/>
+                </a:schemeClr>
+              </a:lnRef>
+              <a:fillRef idx="1">
+                <a:schemeClr val="accent1"/>
+              </a:fillRef>
+              <a:effectRef idx="0">
+                <a:schemeClr val="accent1"/>
+              </a:effectRef>
+              <a:fontRef idx="minor">
+                <a:schemeClr val="lt1"/>
+              </a:fontRef>
+            </p:style>
+            <p:txBody>
+              <a:bodyPr rtlCol="0" anchor="ctr"/>
+              <a:lstStyle/>
+              <a:p>
+                <a:pPr algn="ctr"/>
+                <a:endParaRPr lang="ko-KR" altLang="en-US"/>
+              </a:p>
+            </p:txBody>
+          </p:sp>
+        </p:grpSp>
+      </p:grpSp>
     </p:spTree>
     <p:extLst>
       <p:ext uri="{BB962C8B-B14F-4D97-AF65-F5344CB8AC3E}">
-        <p14:creationId xmlns:p14="http://schemas.microsoft.com/office/powerpoint/2010/main" val="2133854777"/>
+        <p14:creationId xmlns:p14="http://schemas.microsoft.com/office/powerpoint/2010/main" val="1370288356"/>
       </p:ext>
     </p:extLst>
   </p:cSld>
   <p:clrMapOvr>
     <a:masterClrMapping/>
   </p:clrMapOvr>
+  <p:timing>
+    <p:tnLst>
+      <p:par>
+        <p:cTn id="1" dur="indefinite" restart="never" nodeType="tmRoot"/>
+      </p:par>
+    </p:tnLst>
+  </p:timing>
 </p:sld>
 </file>
 

</xml_diff>

<commit_message>
[CYS] update: 8주차 작업물
</commit_message>
<xml_diff>
--- a/예제.pptx
+++ b/예제.pptx
@@ -198,7 +198,7 @@
           <a:p>
             <a:fld id="{6336E10D-C9CD-4DE6-AA5C-F508AA91F13F}" type="datetimeFigureOut">
               <a:rPr lang="ko-KR" altLang="en-US" smtClean="0"/>
-              <a:t>2024-04-09</a:t>
+              <a:t>2024-04-23</a:t>
             </a:fld>
             <a:endParaRPr lang="ko-KR" altLang="en-US"/>
           </a:p>
@@ -597,7 +597,7 @@
           <a:p>
             <a:fld id="{7BEC85B7-4AE5-4F69-B591-0C52ECF45F30}" type="datetime1">
               <a:rPr lang="ko-KR" altLang="en-US" smtClean="0"/>
-              <a:t>2024-04-09</a:t>
+              <a:t>2024-04-23</a:t>
             </a:fld>
             <a:endParaRPr lang="ko-KR" altLang="en-US"/>
           </a:p>
@@ -781,7 +781,7 @@
           <a:p>
             <a:fld id="{9F071616-2469-4292-918B-92EE87C17A41}" type="datetime1">
               <a:rPr lang="ko-KR" altLang="en-US" smtClean="0"/>
-              <a:t>2024-04-09</a:t>
+              <a:t>2024-04-23</a:t>
             </a:fld>
             <a:endParaRPr lang="ko-KR" altLang="en-US"/>
           </a:p>
@@ -968,7 +968,7 @@
           <a:p>
             <a:fld id="{4F9EDEF5-39C0-44B7-ACB1-E4DA65D90603}" type="datetime1">
               <a:rPr lang="ko-KR" altLang="en-US" smtClean="0"/>
-              <a:t>2024-04-09</a:t>
+              <a:t>2024-04-23</a:t>
             </a:fld>
             <a:endParaRPr lang="ko-KR" altLang="en-US"/>
           </a:p>
@@ -1154,7 +1154,7 @@
           <a:p>
             <a:fld id="{F64702D1-1DDD-4C5F-A560-D848F8B0A03E}" type="datetime1">
               <a:rPr lang="ko-KR" altLang="en-US" smtClean="0"/>
-              <a:t>2024-04-09</a:t>
+              <a:t>2024-04-23</a:t>
             </a:fld>
             <a:endParaRPr lang="ko-KR" altLang="en-US"/>
           </a:p>
@@ -1417,7 +1417,7 @@
           <a:p>
             <a:fld id="{B1630A40-B8E3-4B07-96B2-0A0496D85462}" type="datetime1">
               <a:rPr lang="ko-KR" altLang="en-US" smtClean="0"/>
-              <a:t>2024-04-09</a:t>
+              <a:t>2024-04-23</a:t>
             </a:fld>
             <a:endParaRPr lang="ko-KR" altLang="en-US"/>
           </a:p>
@@ -1656,7 +1656,7 @@
           <a:p>
             <a:fld id="{070816A2-BD0B-48A6-8771-F61A12C2CCDC}" type="datetime1">
               <a:rPr lang="ko-KR" altLang="en-US" smtClean="0"/>
-              <a:t>2024-04-09</a:t>
+              <a:t>2024-04-23</a:t>
             </a:fld>
             <a:endParaRPr lang="ko-KR" altLang="en-US"/>
           </a:p>
@@ -2030,7 +2030,7 @@
           <a:p>
             <a:fld id="{F1C79E17-C569-4517-AAF2-2753FE59427A}" type="datetime1">
               <a:rPr lang="ko-KR" altLang="en-US" smtClean="0"/>
-              <a:t>2024-04-09</a:t>
+              <a:t>2024-04-23</a:t>
             </a:fld>
             <a:endParaRPr lang="ko-KR" altLang="en-US"/>
           </a:p>
@@ -2155,7 +2155,7 @@
           <a:p>
             <a:fld id="{41F0635D-524B-4663-9BC9-C6ADC7E11725}" type="datetime1">
               <a:rPr lang="ko-KR" altLang="en-US" smtClean="0"/>
-              <a:t>2024-04-09</a:t>
+              <a:t>2024-04-23</a:t>
             </a:fld>
             <a:endParaRPr lang="ko-KR" altLang="en-US"/>
           </a:p>
@@ -2257,7 +2257,7 @@
           <a:p>
             <a:fld id="{F27D30BF-C775-450E-89AC-CB3CC697C266}" type="datetime1">
               <a:rPr lang="ko-KR" altLang="en-US" smtClean="0"/>
-              <a:t>2024-04-09</a:t>
+              <a:t>2024-04-23</a:t>
             </a:fld>
             <a:endParaRPr lang="ko-KR" altLang="en-US"/>
           </a:p>
@@ -2541,7 +2541,7 @@
           <a:p>
             <a:fld id="{0B9EB9A9-3D6F-4323-868A-2073DCA9B7C7}" type="datetime1">
               <a:rPr lang="ko-KR" altLang="en-US" smtClean="0"/>
-              <a:t>2024-04-09</a:t>
+              <a:t>2024-04-23</a:t>
             </a:fld>
             <a:endParaRPr lang="ko-KR" altLang="en-US"/>
           </a:p>
@@ -2805,7 +2805,7 @@
           <a:p>
             <a:fld id="{0AA9B903-11A0-4F32-BEEA-8500AE50112F}" type="datetime1">
               <a:rPr lang="ko-KR" altLang="en-US" smtClean="0"/>
-              <a:t>2024-04-09</a:t>
+              <a:t>2024-04-23</a:t>
             </a:fld>
             <a:endParaRPr lang="ko-KR" altLang="en-US"/>
           </a:p>
@@ -3025,7 +3025,7 @@
           <a:p>
             <a:fld id="{538B9CE5-2932-49D4-8C6B-AE2DEAF1F894}" type="datetime1">
               <a:rPr lang="ko-KR" altLang="en-US" smtClean="0"/>
-              <a:t>2024-04-09</a:t>
+              <a:t>2024-04-23</a:t>
             </a:fld>
             <a:endParaRPr lang="ko-KR" altLang="en-US"/>
           </a:p>

</xml_diff>